<commit_message>
Changed error in git_intro
</commit_message>
<xml_diff>
--- a/git_intro.pptx
+++ b/git_intro.pptx
@@ -8747,7 +8747,24 @@
                   <a:schemeClr val="tx2"/>
                 </a:solidFill>
               </a:rPr>
-              <a:t> pull </a:t>
+              <a:t> </a:t>
+            </a:r>
+            <a:r>
+              <a:rPr kumimoji="1" lang="en-US" sz="2000" b="1" dirty="0" smtClean="0">
+                <a:solidFill>
+                  <a:schemeClr val="tx2"/>
+                </a:solidFill>
+              </a:rPr>
+              <a:t>clone </a:t>
+            </a:r>
+            <a:r>
+              <a:rPr kumimoji="1" lang="en-US" sz="2000" b="1" dirty="0" smtClean="0">
+                <a:solidFill>
+                  <a:schemeClr val="tx2"/>
+                </a:solidFill>
+                <a:hlinkClick r:id="rId2"/>
+              </a:rPr>
+              <a:t>https</a:t>
             </a:r>
             <a:r>
               <a:rPr kumimoji="1" lang="en-US" sz="2000" b="1" dirty="0">
@@ -8756,7 +8773,7 @@
                 </a:solidFill>
                 <a:hlinkClick r:id="rId2"/>
               </a:rPr>
-              <a:t>https://</a:t>
+              <a:t>://</a:t>
             </a:r>
             <a:r>
               <a:rPr kumimoji="1" lang="en-US" sz="2000" b="1" dirty="0" smtClean="0">

</xml_diff>

<commit_message>
Fixed error in git_intro.pptx
</commit_message>
<xml_diff>
--- a/git_intro.pptx
+++ b/git_intro.pptx
@@ -9210,13 +9210,18 @@
               </a:spcAft>
             </a:pPr>
             <a:r>
-              <a:rPr kumimoji="1" lang="en-US" sz="1600" b="1" dirty="0" smtClean="0">
+              <a:rPr kumimoji="1" lang="en-US" sz="1600" b="1" smtClean="0">
                 <a:solidFill>
                   <a:schemeClr val="tx2"/>
                 </a:solidFill>
               </a:rPr>
-              <a:t>ls</a:t>
-            </a:r>
+              <a:t>dir</a:t>
+            </a:r>
+            <a:endParaRPr kumimoji="1" lang="en-US" sz="1600" b="1" dirty="0" smtClean="0">
+              <a:solidFill>
+                <a:schemeClr val="tx2"/>
+              </a:solidFill>
+            </a:endParaRPr>
           </a:p>
           <a:p>
             <a:pPr>

</xml_diff>

<commit_message>
Added help line to git_intro.pptx
</commit_message>
<xml_diff>
--- a/git_intro.pptx
+++ b/git_intro.pptx
@@ -8701,7 +8701,86 @@
                   <a:schemeClr val="bg1"/>
                 </a:solidFill>
               </a:rPr>
-              <a:t>When current directory is the one you want</a:t>
+              <a:t>For help in </a:t>
+            </a:r>
+            <a:r>
+              <a:rPr kumimoji="1" lang="en-US" sz="2200" b="1" dirty="0" err="1" smtClean="0">
+                <a:solidFill>
+                  <a:schemeClr val="bg1"/>
+                </a:solidFill>
+              </a:rPr>
+              <a:t>git</a:t>
+            </a:r>
+            <a:r>
+              <a:rPr kumimoji="1" lang="en-US" sz="2200" b="1" dirty="0" smtClean="0">
+                <a:solidFill>
+                  <a:schemeClr val="bg1"/>
+                </a:solidFill>
+              </a:rPr>
+              <a:t>:</a:t>
+            </a:r>
+          </a:p>
+          <a:p>
+            <a:pPr lvl="1">
+              <a:lnSpc>
+                <a:spcPts val="3000"/>
+              </a:lnSpc>
+              <a:spcBef>
+                <a:spcPct val="0"/>
+              </a:spcBef>
+              <a:spcAft>
+                <a:spcPts val="1000"/>
+              </a:spcAft>
+            </a:pPr>
+            <a:r>
+              <a:rPr kumimoji="1" lang="en-US" sz="1800" b="1" dirty="0" err="1" smtClean="0">
+                <a:solidFill>
+                  <a:schemeClr val="bg1"/>
+                </a:solidFill>
+              </a:rPr>
+              <a:t>git</a:t>
+            </a:r>
+            <a:r>
+              <a:rPr kumimoji="1" lang="en-US" sz="1800" b="1" smtClean="0">
+                <a:solidFill>
+                  <a:schemeClr val="bg1"/>
+                </a:solidFill>
+              </a:rPr>
+              <a:t> -- help</a:t>
+            </a:r>
+            <a:endParaRPr kumimoji="1" lang="en-US" sz="1800" b="1" smtClean="0">
+              <a:solidFill>
+                <a:schemeClr val="bg1"/>
+              </a:solidFill>
+            </a:endParaRPr>
+          </a:p>
+          <a:p>
+            <a:pPr>
+              <a:lnSpc>
+                <a:spcPts val="3000"/>
+              </a:lnSpc>
+              <a:spcBef>
+                <a:spcPct val="0"/>
+              </a:spcBef>
+              <a:spcAft>
+                <a:spcPts val="1000"/>
+              </a:spcAft>
+            </a:pPr>
+            <a:r>
+              <a:rPr kumimoji="1" lang="en-US" sz="2200" b="1" dirty="0" smtClean="0">
+                <a:solidFill>
+                  <a:schemeClr val="bg1"/>
+                </a:solidFill>
+              </a:rPr>
+              <a:t>When </a:t>
+            </a:r>
+            <a:r>
+              <a:rPr kumimoji="1" lang="en-US" sz="2200" b="1" dirty="0" smtClean="0">
+                <a:solidFill>
+                  <a:schemeClr val="bg1"/>
+                </a:solidFill>
+              </a:rPr>
+              <a:t>current directory is the one you want</a:t>
             </a:r>
             <a:r>
               <a:rPr kumimoji="1" lang="en-US" sz="2200" b="1" dirty="0">
@@ -9068,15 +9147,7 @@
                   <a:schemeClr val="bg1"/>
                 </a:solidFill>
               </a:rPr>
-              <a:t> </a:t>
-            </a:r>
-            <a:r>
-              <a:rPr kumimoji="1" lang="en-US" sz="1800" b="1" dirty="0" smtClean="0">
-                <a:solidFill>
-                  <a:schemeClr val="bg1"/>
-                </a:solidFill>
-              </a:rPr>
-              <a:t>push</a:t>
+              <a:t> push</a:t>
             </a:r>
           </a:p>
           <a:p>
@@ -9136,11 +9207,6 @@
               </a:rPr>
               <a:t> pull</a:t>
             </a:r>
-            <a:endParaRPr kumimoji="1" lang="en-US" sz="1800" b="1" dirty="0" smtClean="0">
-              <a:solidFill>
-                <a:schemeClr val="bg1"/>
-              </a:solidFill>
-            </a:endParaRPr>
           </a:p>
         </p:txBody>
       </p:sp>

</xml_diff>